<commit_message>
Added 5th lecture with contents
</commit_message>
<xml_diff>
--- a/LinuxArch/LinuxArch5.pptx
+++ b/LinuxArch/LinuxArch5.pptx
@@ -17,8 +17,9 @@
     <p:sldId id="396" r:id="rId11"/>
     <p:sldId id="391" r:id="rId12"/>
     <p:sldId id="392" r:id="rId13"/>
-    <p:sldId id="393" r:id="rId14"/>
-    <p:sldId id="394" r:id="rId15"/>
+    <p:sldId id="397" r:id="rId14"/>
+    <p:sldId id="393" r:id="rId15"/>
+    <p:sldId id="394" r:id="rId16"/>
   </p:sldIdLst>
   <p:sldSz cx="12192000" cy="6858000"/>
   <p:notesSz cx="6858000" cy="9144000"/>
@@ -274,7 +275,7 @@
           <a:p>
             <a:fld id="{052ECE81-C73C-E543-9046-300010F65159}" type="datetimeFigureOut">
               <a:rPr lang="en-RU" smtClean="0"/>
-              <a:t>12.12.2020</a:t>
+              <a:t>18.12.2020</a:t>
             </a:fld>
             <a:endParaRPr lang="en-RU"/>
           </a:p>
@@ -474,7 +475,7 @@
           <a:p>
             <a:fld id="{052ECE81-C73C-E543-9046-300010F65159}" type="datetimeFigureOut">
               <a:rPr lang="en-RU" smtClean="0"/>
-              <a:t>12.12.2020</a:t>
+              <a:t>18.12.2020</a:t>
             </a:fld>
             <a:endParaRPr lang="en-RU"/>
           </a:p>
@@ -684,7 +685,7 @@
           <a:p>
             <a:fld id="{052ECE81-C73C-E543-9046-300010F65159}" type="datetimeFigureOut">
               <a:rPr lang="en-RU" smtClean="0"/>
-              <a:t>12.12.2020</a:t>
+              <a:t>18.12.2020</a:t>
             </a:fld>
             <a:endParaRPr lang="en-RU"/>
           </a:p>
@@ -10286,7 +10287,7 @@
           <a:p>
             <a:fld id="{052ECE81-C73C-E543-9046-300010F65159}" type="datetimeFigureOut">
               <a:rPr lang="en-RU" smtClean="0"/>
-              <a:t>12.12.2020</a:t>
+              <a:t>18.12.2020</a:t>
             </a:fld>
             <a:endParaRPr lang="en-RU"/>
           </a:p>
@@ -17917,7 +17918,7 @@
           </a:ln>
           <a:extLst>
             <a:ext uri="{C572A759-6A51-4108-AA02-DFA0A04FC94B}">
-              <ma14:wrappingTextBoxFlag xmlns="" xmlns:ma14="http://schemas.microsoft.com/office/mac/drawingml/2011/main" val="1"/>
+              <ma14:wrappingTextBoxFlag xmlns:ma14="http://schemas.microsoft.com/office/mac/drawingml/2011/main" xmlns="" val="1"/>
             </a:ext>
           </a:extLst>
         </p:spPr>
@@ -18977,7 +18978,7 @@
           <a:p>
             <a:fld id="{052ECE81-C73C-E543-9046-300010F65159}" type="datetimeFigureOut">
               <a:rPr lang="en-RU" smtClean="0"/>
-              <a:t>12.12.2020</a:t>
+              <a:t>18.12.2020</a:t>
             </a:fld>
             <a:endParaRPr lang="en-RU"/>
           </a:p>
@@ -19245,7 +19246,7 @@
           <a:p>
             <a:fld id="{052ECE81-C73C-E543-9046-300010F65159}" type="datetimeFigureOut">
               <a:rPr lang="en-RU" smtClean="0"/>
-              <a:t>12.12.2020</a:t>
+              <a:t>18.12.2020</a:t>
             </a:fld>
             <a:endParaRPr lang="en-RU"/>
           </a:p>
@@ -19660,7 +19661,7 @@
           <a:p>
             <a:fld id="{052ECE81-C73C-E543-9046-300010F65159}" type="datetimeFigureOut">
               <a:rPr lang="en-RU" smtClean="0"/>
-              <a:t>12.12.2020</a:t>
+              <a:t>18.12.2020</a:t>
             </a:fld>
             <a:endParaRPr lang="en-RU"/>
           </a:p>
@@ -19802,7 +19803,7 @@
           <a:p>
             <a:fld id="{052ECE81-C73C-E543-9046-300010F65159}" type="datetimeFigureOut">
               <a:rPr lang="en-RU" smtClean="0"/>
-              <a:t>12.12.2020</a:t>
+              <a:t>18.12.2020</a:t>
             </a:fld>
             <a:endParaRPr lang="en-RU"/>
           </a:p>
@@ -19915,7 +19916,7 @@
           <a:p>
             <a:fld id="{052ECE81-C73C-E543-9046-300010F65159}" type="datetimeFigureOut">
               <a:rPr lang="en-RU" smtClean="0"/>
-              <a:t>12.12.2020</a:t>
+              <a:t>18.12.2020</a:t>
             </a:fld>
             <a:endParaRPr lang="en-RU"/>
           </a:p>
@@ -20228,7 +20229,7 @@
           <a:p>
             <a:fld id="{052ECE81-C73C-E543-9046-300010F65159}" type="datetimeFigureOut">
               <a:rPr lang="en-RU" smtClean="0"/>
-              <a:t>12.12.2020</a:t>
+              <a:t>18.12.2020</a:t>
             </a:fld>
             <a:endParaRPr lang="en-RU"/>
           </a:p>
@@ -20517,7 +20518,7 @@
           <a:p>
             <a:fld id="{052ECE81-C73C-E543-9046-300010F65159}" type="datetimeFigureOut">
               <a:rPr lang="en-RU" smtClean="0"/>
-              <a:t>12.12.2020</a:t>
+              <a:t>18.12.2020</a:t>
             </a:fld>
             <a:endParaRPr lang="en-RU"/>
           </a:p>
@@ -20760,7 +20761,7 @@
           <a:p>
             <a:fld id="{052ECE81-C73C-E543-9046-300010F65159}" type="datetimeFigureOut">
               <a:rPr lang="en-RU" smtClean="0"/>
-              <a:t>12.12.2020</a:t>
+              <a:t>18.12.2020</a:t>
             </a:fld>
             <a:endParaRPr lang="en-RU"/>
           </a:p>
@@ -22537,33 +22538,6 @@
       </p:grpSpPr>
       <p:sp>
         <p:nvSpPr>
-          <p:cNvPr id="2" name="Content Placeholder 1">
-            <a:extLst>
-              <a:ext uri="{FF2B5EF4-FFF2-40B4-BE49-F238E27FC236}">
-                <a16:creationId xmlns:a16="http://schemas.microsoft.com/office/drawing/2014/main" id="{5BA0F083-B66A-4CF4-8CE4-B01CF146F152}"/>
-              </a:ext>
-            </a:extLst>
-          </p:cNvPr>
-          <p:cNvSpPr>
-            <a:spLocks noGrp="1"/>
-          </p:cNvSpPr>
-          <p:nvPr>
-            <p:ph idx="1"/>
-          </p:nvPr>
-        </p:nvSpPr>
-        <p:spPr/>
-        <p:txBody>
-          <a:bodyPr>
-            <a:normAutofit/>
-          </a:bodyPr>
-          <a:lstStyle/>
-          <a:p>
-            <a:endParaRPr lang="en-US" dirty="0"/>
-          </a:p>
-        </p:txBody>
-      </p:sp>
-      <p:sp>
-        <p:nvSpPr>
           <p:cNvPr id="3" name="Text Placeholder 2">
             <a:extLst>
               <a:ext uri="{FF2B5EF4-FFF2-40B4-BE49-F238E27FC236}">
@@ -22587,6 +22561,158 @@
               <a:rPr lang="en-US" dirty="0"/>
               <a:t>trap</a:t>
             </a:r>
+          </a:p>
+        </p:txBody>
+      </p:sp>
+      <p:sp>
+        <p:nvSpPr>
+          <p:cNvPr id="4" name="TextBox 3">
+            <a:extLst>
+              <a:ext uri="{FF2B5EF4-FFF2-40B4-BE49-F238E27FC236}">
+                <a16:creationId xmlns:a16="http://schemas.microsoft.com/office/drawing/2014/main" id="{80FBD02F-4240-A84B-AF6C-7BB6B27E232E}"/>
+              </a:ext>
+            </a:extLst>
+          </p:cNvPr>
+          <p:cNvSpPr txBox="1"/>
+          <p:nvPr/>
+        </p:nvSpPr>
+        <p:spPr>
+          <a:xfrm>
+            <a:off x="775251" y="1828800"/>
+            <a:ext cx="8627165" cy="3693319"/>
+          </a:xfrm>
+          <a:prstGeom prst="rect">
+            <a:avLst/>
+          </a:prstGeom>
+          <a:noFill/>
+        </p:spPr>
+        <p:txBody>
+          <a:bodyPr wrap="square" rtlCol="0">
+            <a:spAutoFit/>
+          </a:bodyPr>
+          <a:lstStyle/>
+          <a:p>
+            <a:r>
+              <a:rPr lang="en-GB" dirty="0" err="1"/>
+              <a:t>tempfile</a:t>
+            </a:r>
+            <a:r>
+              <a:rPr lang="en-GB" dirty="0"/>
+              <a:t>=/</a:t>
+            </a:r>
+            <a:r>
+              <a:rPr lang="en-GB" dirty="0" err="1"/>
+              <a:t>tmp</a:t>
+            </a:r>
+            <a:r>
+              <a:rPr lang="en-GB" dirty="0"/>
+              <a:t>/</a:t>
+            </a:r>
+            <a:r>
+              <a:rPr lang="en-GB" dirty="0" err="1"/>
+              <a:t>tmpdata</a:t>
+            </a:r>
+            <a:br>
+              <a:rPr lang="en-GB" dirty="0"/>
+            </a:br>
+            <a:r>
+              <a:rPr lang="en-GB" dirty="0"/>
+              <a:t>trap "rm -f $</a:t>
+            </a:r>
+            <a:r>
+              <a:rPr lang="en-GB" dirty="0" err="1"/>
+              <a:t>tempfile</a:t>
+            </a:r>
+            <a:r>
+              <a:rPr lang="en-GB" dirty="0"/>
+              <a:t>" EXIT</a:t>
+            </a:r>
+            <a:br>
+              <a:rPr lang="en-GB" dirty="0"/>
+            </a:br>
+            <a:br>
+              <a:rPr lang="en-GB" dirty="0"/>
+            </a:br>
+            <a:r>
+              <a:rPr lang="en-GB" b="1" dirty="0"/>
+              <a:t>function</a:t>
+            </a:r>
+            <a:r>
+              <a:rPr lang="en-GB" dirty="0"/>
+              <a:t> </a:t>
+            </a:r>
+            <a:r>
+              <a:rPr lang="en-GB" dirty="0" err="1"/>
+              <a:t>cleanup</a:t>
+            </a:r>
+            <a:r>
+              <a:rPr lang="en-GB" dirty="0"/>
+              <a:t>()</a:t>
+            </a:r>
+            <a:br>
+              <a:rPr lang="en-GB" dirty="0"/>
+            </a:br>
+            <a:r>
+              <a:rPr lang="en-GB" dirty="0"/>
+              <a:t>{ </a:t>
+            </a:r>
+            <a:r>
+              <a:rPr lang="en-GB" i="1" dirty="0"/>
+              <a:t># ...</a:t>
+            </a:r>
+            <a:r>
+              <a:rPr lang="en-GB" dirty="0"/>
+              <a:t> } </a:t>
+            </a:r>
+            <a:br>
+              <a:rPr lang="en-GB" dirty="0"/>
+            </a:br>
+            <a:r>
+              <a:rPr lang="en-GB" dirty="0"/>
+              <a:t>trap </a:t>
+            </a:r>
+            <a:r>
+              <a:rPr lang="en-GB" dirty="0" err="1"/>
+              <a:t>cleanup</a:t>
+            </a:r>
+            <a:r>
+              <a:rPr lang="en-GB" dirty="0"/>
+              <a:t> EXIT</a:t>
+            </a:r>
+            <a:br>
+              <a:rPr lang="en-GB" dirty="0"/>
+            </a:br>
+            <a:br>
+              <a:rPr lang="en-GB" dirty="0"/>
+            </a:br>
+            <a:br>
+              <a:rPr lang="en-GB" dirty="0"/>
+            </a:br>
+            <a:r>
+              <a:rPr lang="en-GB" dirty="0">
+                <a:hlinkClick r:id="rId2"/>
+              </a:rPr>
+              <a:t>https://www.linuxjournal.com/content/bash-trap-command</a:t>
+            </a:r>
+            <a:br>
+              <a:rPr lang="en-GB" dirty="0"/>
+            </a:br>
+            <a:br>
+              <a:rPr lang="en-GB" dirty="0"/>
+            </a:br>
+            <a:r>
+              <a:rPr lang="en-GB" dirty="0">
+                <a:hlinkClick r:id="rId3"/>
+              </a:rPr>
+              <a:t>https://opensource.com/article/20/6/bash-trap</a:t>
+            </a:r>
+            <a:br>
+              <a:rPr lang="en-GB" dirty="0"/>
+            </a:br>
+            <a:br>
+              <a:rPr lang="en-GB" dirty="0"/>
+            </a:br>
+            <a:endParaRPr lang="en-RU" dirty="0"/>
           </a:p>
         </p:txBody>
       </p:sp>
@@ -22643,6 +22769,18 @@
           </a:bodyPr>
           <a:lstStyle/>
           <a:p>
+            <a:r>
+              <a:rPr lang="en-US" dirty="0">
+                <a:hlinkClick r:id="rId2"/>
+              </a:rPr>
+              <a:t>https://www.computerhope.com/unix/bash/read.htm</a:t>
+            </a:r>
+            <a:endParaRPr lang="en-US" dirty="0"/>
+          </a:p>
+          <a:p>
+            <a:endParaRPr lang="en-US" dirty="0"/>
+          </a:p>
+          <a:p>
             <a:endParaRPr lang="en-US" dirty="0"/>
           </a:p>
         </p:txBody>
@@ -22670,7 +22808,7 @@
           <a:p>
             <a:r>
               <a:rPr lang="en-US" dirty="0"/>
-              <a:t>select</a:t>
+              <a:t>read</a:t>
             </a:r>
           </a:p>
         </p:txBody>
@@ -22728,6 +22866,91 @@
           </a:bodyPr>
           <a:lstStyle/>
           <a:p>
+            <a:r>
+              <a:rPr lang="en-GB" dirty="0"/>
+              <a:t>exec 3&lt;&gt;/dev/</a:t>
+            </a:r>
+            <a:r>
+              <a:rPr lang="en-GB" dirty="0" err="1"/>
+              <a:t>tcp</a:t>
+            </a:r>
+            <a:r>
+              <a:rPr lang="en-GB" dirty="0"/>
+              <a:t>/</a:t>
+            </a:r>
+            <a:r>
+              <a:rPr lang="en-GB" dirty="0" err="1"/>
+              <a:t>www.google.com</a:t>
+            </a:r>
+            <a:r>
+              <a:rPr lang="en-GB" dirty="0"/>
+              <a:t>/80</a:t>
+            </a:r>
+            <a:br>
+              <a:rPr lang="en-GB" dirty="0"/>
+            </a:br>
+            <a:r>
+              <a:rPr lang="en-GB" dirty="0"/>
+              <a:t>echo -e "GET / HTTP/1.1\r\</a:t>
+            </a:r>
+            <a:r>
+              <a:rPr lang="en-GB" dirty="0" err="1"/>
+              <a:t>nhost</a:t>
+            </a:r>
+            <a:r>
+              <a:rPr lang="en-GB" dirty="0"/>
+              <a:t>: http://</a:t>
+            </a:r>
+            <a:r>
+              <a:rPr lang="en-GB" dirty="0" err="1"/>
+              <a:t>www.google.com</a:t>
+            </a:r>
+            <a:r>
+              <a:rPr lang="en-GB" dirty="0"/>
+              <a:t>\r\</a:t>
+            </a:r>
+            <a:r>
+              <a:rPr lang="en-GB" dirty="0" err="1"/>
+              <a:t>nConnection</a:t>
+            </a:r>
+            <a:r>
+              <a:rPr lang="en-GB" dirty="0"/>
+              <a:t>: close\r\n\r\n" &gt;&amp;3</a:t>
+            </a:r>
+            <a:br>
+              <a:rPr lang="en-GB" dirty="0"/>
+            </a:br>
+            <a:r>
+              <a:rPr lang="en-GB" dirty="0"/>
+              <a:t>cat &lt;&amp;3</a:t>
+            </a:r>
+          </a:p>
+          <a:p>
+            <a:endParaRPr lang="en-GB" dirty="0"/>
+          </a:p>
+          <a:p>
+            <a:r>
+              <a:rPr lang="en-GB" dirty="0"/>
+              <a:t>cat &lt;/dev/</a:t>
+            </a:r>
+            <a:r>
+              <a:rPr lang="en-GB" dirty="0" err="1"/>
+              <a:t>tcp</a:t>
+            </a:r>
+            <a:r>
+              <a:rPr lang="en-GB" dirty="0"/>
+              <a:t>/</a:t>
+            </a:r>
+            <a:r>
+              <a:rPr lang="en-GB" dirty="0" err="1"/>
+              <a:t>time.nist.gov</a:t>
+            </a:r>
+            <a:r>
+              <a:rPr lang="en-GB" dirty="0"/>
+              <a:t>/13</a:t>
+            </a:r>
+          </a:p>
+          <a:p>
             <a:endParaRPr lang="en-US" dirty="0"/>
           </a:p>
         </p:txBody>
@@ -22755,8 +22978,294 @@
           <a:p>
             <a:r>
               <a:rPr lang="en-US" dirty="0"/>
-              <a:t>read</a:t>
-            </a:r>
+              <a:t>exec</a:t>
+            </a:r>
+          </a:p>
+        </p:txBody>
+      </p:sp>
+    </p:spTree>
+    <p:extLst>
+      <p:ext uri="{BB962C8B-B14F-4D97-AF65-F5344CB8AC3E}">
+        <p14:creationId xmlns:p14="http://schemas.microsoft.com/office/powerpoint/2010/main" val="3622506324"/>
+      </p:ext>
+    </p:extLst>
+  </p:cSld>
+  <p:clrMapOvr>
+    <a:masterClrMapping/>
+  </p:clrMapOvr>
+</p:sld>
+</file>
+
+<file path=ppt/slides/slide13.xml><?xml version="1.0" encoding="utf-8"?>
+<p:sld xmlns:a="http://schemas.openxmlformats.org/drawingml/2006/main" xmlns:r="http://schemas.openxmlformats.org/officeDocument/2006/relationships" xmlns:p="http://schemas.openxmlformats.org/presentationml/2006/main">
+  <p:cSld>
+    <p:spTree>
+      <p:nvGrpSpPr>
+        <p:cNvPr id="1" name=""/>
+        <p:cNvGrpSpPr/>
+        <p:nvPr/>
+      </p:nvGrpSpPr>
+      <p:grpSpPr>
+        <a:xfrm>
+          <a:off x="0" y="0"/>
+          <a:ext cx="0" cy="0"/>
+          <a:chOff x="0" y="0"/>
+          <a:chExt cx="0" cy="0"/>
+        </a:xfrm>
+      </p:grpSpPr>
+      <p:sp>
+        <p:nvSpPr>
+          <p:cNvPr id="3" name="Text Placeholder 2">
+            <a:extLst>
+              <a:ext uri="{FF2B5EF4-FFF2-40B4-BE49-F238E27FC236}">
+                <a16:creationId xmlns:a16="http://schemas.microsoft.com/office/drawing/2014/main" id="{99F5DBC8-929E-455F-BA07-52462E7B4FC5}"/>
+              </a:ext>
+            </a:extLst>
+          </p:cNvPr>
+          <p:cNvSpPr>
+            <a:spLocks noGrp="1"/>
+          </p:cNvSpPr>
+          <p:nvPr>
+            <p:ph type="body" sz="quarter" idx="10"/>
+          </p:nvPr>
+        </p:nvSpPr>
+        <p:spPr/>
+        <p:txBody>
+          <a:bodyPr/>
+          <a:lstStyle/>
+          <a:p>
+            <a:r>
+              <a:rPr lang="en-US" dirty="0"/>
+              <a:t>select</a:t>
+            </a:r>
+          </a:p>
+        </p:txBody>
+      </p:sp>
+      <p:sp>
+        <p:nvSpPr>
+          <p:cNvPr id="4" name="TextBox 3">
+            <a:extLst>
+              <a:ext uri="{FF2B5EF4-FFF2-40B4-BE49-F238E27FC236}">
+                <a16:creationId xmlns:a16="http://schemas.microsoft.com/office/drawing/2014/main" id="{68C23E03-538A-E047-BA3D-2808D9D39119}"/>
+              </a:ext>
+            </a:extLst>
+          </p:cNvPr>
+          <p:cNvSpPr txBox="1"/>
+          <p:nvPr/>
+        </p:nvSpPr>
+        <p:spPr>
+          <a:xfrm>
+            <a:off x="377687" y="1073426"/>
+            <a:ext cx="11370029" cy="5478423"/>
+          </a:xfrm>
+          <a:prstGeom prst="rect">
+            <a:avLst/>
+          </a:prstGeom>
+          <a:noFill/>
+        </p:spPr>
+        <p:txBody>
+          <a:bodyPr wrap="square" rtlCol="0">
+            <a:spAutoFit/>
+          </a:bodyPr>
+          <a:lstStyle/>
+          <a:p>
+            <a:r>
+              <a:rPr lang="en-GB" sz="1400" dirty="0"/>
+              <a:t>calculate () {</a:t>
+            </a:r>
+            <a:br>
+              <a:rPr lang="en-GB" sz="1400" dirty="0"/>
+            </a:br>
+            <a:r>
+              <a:rPr lang="en-GB" sz="1400" dirty="0"/>
+              <a:t>   read -p "Enter the first number: " n1</a:t>
+            </a:r>
+            <a:br>
+              <a:rPr lang="en-GB" sz="1400" dirty="0"/>
+            </a:br>
+            <a:r>
+              <a:rPr lang="en-GB" sz="1400" dirty="0"/>
+              <a:t>   read -p "Enter the second number: " n2</a:t>
+            </a:r>
+            <a:br>
+              <a:rPr lang="en-GB" sz="1400" dirty="0"/>
+            </a:br>
+            <a:r>
+              <a:rPr lang="en-GB" sz="1400" dirty="0"/>
+              <a:t>   echo "$n1 $1 $n2 = " </a:t>
+            </a:r>
+            <a:r>
+              <a:rPr lang="en-GB" sz="1400" b="1" dirty="0"/>
+              <a:t>$(</a:t>
+            </a:r>
+            <a:r>
+              <a:rPr lang="en-GB" sz="1400" dirty="0" err="1"/>
+              <a:t>bc</a:t>
+            </a:r>
+            <a:r>
+              <a:rPr lang="en-GB" sz="1400" dirty="0"/>
+              <a:t> -l &lt;&lt;&lt; "$n1$1$n2"</a:t>
+            </a:r>
+            <a:r>
+              <a:rPr lang="en-GB" sz="1400" b="1" dirty="0"/>
+              <a:t>)</a:t>
+            </a:r>
+            <a:r>
+              <a:rPr lang="en-GB" sz="1400" dirty="0"/>
+              <a:t> </a:t>
+            </a:r>
+            <a:br>
+              <a:rPr lang="en-GB" sz="1400" dirty="0"/>
+            </a:br>
+            <a:r>
+              <a:rPr lang="en-GB" sz="1400" dirty="0"/>
+              <a:t>}</a:t>
+            </a:r>
+            <a:br>
+              <a:rPr lang="en-GB" sz="1400" dirty="0"/>
+            </a:br>
+            <a:br>
+              <a:rPr lang="en-GB" sz="1400" dirty="0"/>
+            </a:br>
+            <a:r>
+              <a:rPr lang="en-GB" sz="1400" dirty="0"/>
+              <a:t>PS3="Select the operation: ”</a:t>
+            </a:r>
+            <a:br>
+              <a:rPr lang="en-GB" sz="1400" dirty="0"/>
+            </a:br>
+            <a:br>
+              <a:rPr lang="en-GB" sz="1400" dirty="0"/>
+            </a:br>
+            <a:r>
+              <a:rPr lang="en-GB" sz="1400" b="1" dirty="0"/>
+              <a:t>select</a:t>
+            </a:r>
+            <a:r>
+              <a:rPr lang="en-GB" sz="1400" dirty="0"/>
+              <a:t> opt in add subtract multiply divide quit;</a:t>
+            </a:r>
+            <a:br>
+              <a:rPr lang="en-GB" sz="1400" dirty="0"/>
+            </a:br>
+            <a:r>
+              <a:rPr lang="en-GB" sz="1400" b="1" dirty="0"/>
+              <a:t>do</a:t>
+            </a:r>
+            <a:br>
+              <a:rPr lang="en-GB" sz="1400" b="1" dirty="0"/>
+            </a:br>
+            <a:r>
+              <a:rPr lang="en-GB" sz="1400" b="1" dirty="0"/>
+              <a:t>    case</a:t>
+            </a:r>
+            <a:r>
+              <a:rPr lang="en-GB" sz="1400" dirty="0"/>
+              <a:t> $opt in</a:t>
+            </a:r>
+            <a:br>
+              <a:rPr lang="en-GB" sz="1400" dirty="0"/>
+            </a:br>
+            <a:r>
+              <a:rPr lang="en-GB" sz="1400" dirty="0"/>
+              <a:t>        add)</a:t>
+            </a:r>
+            <a:br>
+              <a:rPr lang="en-GB" sz="1400" dirty="0"/>
+            </a:br>
+            <a:r>
+              <a:rPr lang="en-GB" sz="1400" dirty="0"/>
+              <a:t>            calculate "+";;</a:t>
+            </a:r>
+            <a:br>
+              <a:rPr lang="en-GB" sz="1400" dirty="0"/>
+            </a:br>
+            <a:r>
+              <a:rPr lang="en-GB" sz="1400" dirty="0"/>
+              <a:t>        subtract)</a:t>
+            </a:r>
+            <a:br>
+              <a:rPr lang="en-GB" sz="1400" dirty="0"/>
+            </a:br>
+            <a:r>
+              <a:rPr lang="en-GB" sz="1400" dirty="0"/>
+              <a:t>            calculate "-";;</a:t>
+            </a:r>
+            <a:br>
+              <a:rPr lang="en-GB" sz="1400" dirty="0"/>
+            </a:br>
+            <a:r>
+              <a:rPr lang="en-GB" sz="1400" dirty="0"/>
+              <a:t>        multiply)</a:t>
+            </a:r>
+            <a:br>
+              <a:rPr lang="en-GB" sz="1400" dirty="0"/>
+            </a:br>
+            <a:r>
+              <a:rPr lang="en-GB" sz="1400" dirty="0"/>
+              <a:t>            calculate "*";;</a:t>
+            </a:r>
+            <a:br>
+              <a:rPr lang="en-GB" sz="1400" dirty="0"/>
+            </a:br>
+            <a:r>
+              <a:rPr lang="en-GB" sz="1400" dirty="0"/>
+              <a:t>        divide)</a:t>
+            </a:r>
+            <a:br>
+              <a:rPr lang="en-GB" sz="1400" dirty="0"/>
+            </a:br>
+            <a:r>
+              <a:rPr lang="en-GB" sz="1400" dirty="0"/>
+              <a:t>            calculate "/";;</a:t>
+            </a:r>
+            <a:br>
+              <a:rPr lang="en-GB" sz="1400" dirty="0"/>
+            </a:br>
+            <a:r>
+              <a:rPr lang="en-GB" sz="1400" dirty="0"/>
+              <a:t>        quit)</a:t>
+            </a:r>
+            <a:br>
+              <a:rPr lang="en-GB" sz="1400" dirty="0"/>
+            </a:br>
+            <a:r>
+              <a:rPr lang="en-GB" sz="1400" dirty="0"/>
+              <a:t>            break;;</a:t>
+            </a:r>
+            <a:br>
+              <a:rPr lang="en-GB" sz="1400" dirty="0"/>
+            </a:br>
+            <a:r>
+              <a:rPr lang="en-GB" sz="1400" dirty="0"/>
+              <a:t>        *)</a:t>
+            </a:r>
+            <a:br>
+              <a:rPr lang="en-GB" sz="1400" dirty="0"/>
+            </a:br>
+            <a:r>
+              <a:rPr lang="en-GB" sz="1400" dirty="0"/>
+              <a:t>            echo "Invalid option $REPLY";;</a:t>
+            </a:r>
+            <a:br>
+              <a:rPr lang="en-GB" sz="1400" dirty="0"/>
+            </a:br>
+            <a:r>
+              <a:rPr lang="en-GB" sz="1400" dirty="0"/>
+              <a:t>     </a:t>
+            </a:r>
+            <a:r>
+              <a:rPr lang="en-GB" sz="1400" b="1" dirty="0" err="1"/>
+              <a:t>esac</a:t>
+            </a:r>
+            <a:br>
+              <a:rPr lang="en-GB" sz="1400" b="1" dirty="0"/>
+            </a:br>
+            <a:r>
+              <a:rPr lang="en-GB" sz="1400" b="1" dirty="0"/>
+              <a:t>done</a:t>
+            </a:r>
+            <a:endParaRPr lang="en-RU" sz="1400" dirty="0"/>
           </a:p>
         </p:txBody>
       </p:sp>
@@ -22773,7 +23282,7 @@
 </p:sld>
 </file>
 
-<file path=ppt/slides/slide13.xml><?xml version="1.0" encoding="utf-8"?>
+<file path=ppt/slides/slide14.xml><?xml version="1.0" encoding="utf-8"?>
 <p:sld xmlns:a="http://schemas.openxmlformats.org/drawingml/2006/main" xmlns:r="http://schemas.openxmlformats.org/officeDocument/2006/relationships" xmlns:p="http://schemas.openxmlformats.org/presentationml/2006/main">
   <p:cSld>
     <p:spTree>
@@ -22806,14 +23315,285 @@
             <p:ph idx="1"/>
           </p:nvPr>
         </p:nvSpPr>
-        <p:spPr/>
+        <p:spPr>
+          <a:xfrm>
+            <a:off x="0" y="932687"/>
+            <a:ext cx="11966713" cy="6342755"/>
+          </a:xfrm>
+        </p:spPr>
         <p:txBody>
           <a:bodyPr>
-            <a:normAutofit/>
+            <a:noAutofit/>
           </a:bodyPr>
           <a:lstStyle/>
           <a:p>
-            <a:endParaRPr lang="en-US" dirty="0"/>
+            <a:pPr fontAlgn="base"/>
+            <a:r>
+              <a:rPr lang="en-GB" sz="1100" dirty="0"/>
+              <a:t>[[ is not available in </a:t>
+            </a:r>
+            <a:r>
+              <a:rPr lang="en-GB" sz="1100" dirty="0" err="1"/>
+              <a:t>sh</a:t>
+            </a:r>
+            <a:r>
+              <a:rPr lang="en-GB" sz="1100" dirty="0"/>
+              <a:t> (only [ which is more clunky and limited). See also </a:t>
+            </a:r>
+            <a:r>
+              <a:rPr lang="en-GB" sz="1100" u="sng" dirty="0">
+                <a:hlinkClick r:id="rId2"/>
+              </a:rPr>
+              <a:t>Difference between single and double square brackets in Bash</a:t>
+            </a:r>
+            <a:endParaRPr lang="en-GB" sz="1100" dirty="0"/>
+          </a:p>
+          <a:p>
+            <a:pPr fontAlgn="base"/>
+            <a:r>
+              <a:rPr lang="en-GB" sz="1100" dirty="0" err="1"/>
+              <a:t>sh</a:t>
+            </a:r>
+            <a:r>
+              <a:rPr lang="en-GB" sz="1100" dirty="0"/>
+              <a:t> does not have arrays.</a:t>
+            </a:r>
+          </a:p>
+          <a:p>
+            <a:pPr fontAlgn="base"/>
+            <a:r>
+              <a:rPr lang="en-GB" sz="1100" dirty="0"/>
+              <a:t>Some Bash keywords like local, source, function, </a:t>
+            </a:r>
+            <a:r>
+              <a:rPr lang="en-GB" sz="1100" dirty="0" err="1"/>
+              <a:t>shopt</a:t>
+            </a:r>
+            <a:r>
+              <a:rPr lang="en-GB" sz="1100" dirty="0"/>
+              <a:t>, let, declare, and select are not portable to sh. (Some </a:t>
+            </a:r>
+            <a:r>
+              <a:rPr lang="en-GB" sz="1100" dirty="0" err="1"/>
+              <a:t>shimplementations</a:t>
+            </a:r>
+            <a:r>
+              <a:rPr lang="en-GB" sz="1100" dirty="0"/>
+              <a:t> support e.g. local.)</a:t>
+            </a:r>
+          </a:p>
+          <a:p>
+            <a:pPr fontAlgn="base"/>
+            <a:r>
+              <a:rPr lang="en-GB" sz="1100" dirty="0"/>
+              <a:t>Bash has many C-style syntax extensions like the three-argument for((</a:t>
+            </a:r>
+            <a:r>
+              <a:rPr lang="en-GB" sz="1100" dirty="0" err="1"/>
+              <a:t>i</a:t>
+            </a:r>
+            <a:r>
+              <a:rPr lang="en-GB" sz="1100" dirty="0"/>
+              <a:t>=0;i&lt;=3;i++)) loop, += increment assignment, etc. The $'string\</a:t>
+            </a:r>
+            <a:r>
+              <a:rPr lang="en-GB" sz="1100" dirty="0" err="1"/>
+              <a:t>nwith</a:t>
+            </a:r>
+            <a:r>
+              <a:rPr lang="en-GB" sz="1100" dirty="0"/>
+              <a:t>\</a:t>
+            </a:r>
+            <a:r>
+              <a:rPr lang="en-GB" sz="1100" dirty="0" err="1"/>
+              <a:t>tC</a:t>
+            </a:r>
+            <a:r>
+              <a:rPr lang="en-GB" sz="1100" dirty="0"/>
+              <a:t>\</a:t>
+            </a:r>
+            <a:r>
+              <a:rPr lang="en-GB" sz="1100" dirty="0" err="1"/>
+              <a:t>aescapes</a:t>
+            </a:r>
+            <a:r>
+              <a:rPr lang="en-GB" sz="1100" dirty="0"/>
+              <a:t>' feature is tentatively </a:t>
+            </a:r>
+            <a:r>
+              <a:rPr lang="en-GB" sz="1100" u="sng" dirty="0">
+                <a:hlinkClick r:id="rId3"/>
+              </a:rPr>
+              <a:t>accepted for POSIX</a:t>
+            </a:r>
+            <a:r>
+              <a:rPr lang="en-GB" sz="1100" dirty="0"/>
+              <a:t> (meaning it works in Bash now, but will not yet be supported by </a:t>
+            </a:r>
+            <a:r>
+              <a:rPr lang="en-GB" sz="1100" dirty="0" err="1"/>
+              <a:t>sh</a:t>
+            </a:r>
+            <a:r>
+              <a:rPr lang="en-GB" sz="1100" dirty="0"/>
+              <a:t> on systems which only adhere to the current POSIX specification, and likely will not for some time to come).</a:t>
+            </a:r>
+          </a:p>
+          <a:p>
+            <a:pPr fontAlgn="base"/>
+            <a:r>
+              <a:rPr lang="en-GB" sz="1100" dirty="0"/>
+              <a:t>Bash supports &lt;&lt;&lt;'here strings'.</a:t>
+            </a:r>
+          </a:p>
+          <a:p>
+            <a:pPr fontAlgn="base"/>
+            <a:r>
+              <a:rPr lang="en-GB" sz="1100" dirty="0"/>
+              <a:t>Bash has *.{</a:t>
+            </a:r>
+            <a:r>
+              <a:rPr lang="en-GB" sz="1100" dirty="0" err="1"/>
+              <a:t>png,jpg</a:t>
+            </a:r>
+            <a:r>
+              <a:rPr lang="en-GB" sz="1100" dirty="0"/>
+              <a:t>} and {0..12} brace expansion.</a:t>
+            </a:r>
+          </a:p>
+          <a:p>
+            <a:pPr fontAlgn="base"/>
+            <a:r>
+              <a:rPr lang="en-GB" sz="1100" dirty="0"/>
+              <a:t>~ refers to $HOME only in Bash (and more generally ~username to the home directory of username).This is in POSIX, but may be missing from some pre-POSIX /bin/</a:t>
+            </a:r>
+            <a:r>
+              <a:rPr lang="en-GB" sz="1100" dirty="0" err="1"/>
+              <a:t>sh</a:t>
+            </a:r>
+            <a:r>
+              <a:rPr lang="en-GB" sz="1100" dirty="0"/>
+              <a:t> implementations.</a:t>
+            </a:r>
+          </a:p>
+          <a:p>
+            <a:pPr fontAlgn="base"/>
+            <a:r>
+              <a:rPr lang="en-GB" sz="1100" dirty="0"/>
+              <a:t>Bash has process substitution with &lt;(</a:t>
+            </a:r>
+            <a:r>
+              <a:rPr lang="en-GB" sz="1100" dirty="0" err="1"/>
+              <a:t>cmd</a:t>
+            </a:r>
+            <a:r>
+              <a:rPr lang="en-GB" sz="1100" dirty="0"/>
+              <a:t>) and &gt;(</a:t>
+            </a:r>
+            <a:r>
+              <a:rPr lang="en-GB" sz="1100" dirty="0" err="1"/>
+              <a:t>cmd</a:t>
+            </a:r>
+            <a:r>
+              <a:rPr lang="en-GB" sz="1100" dirty="0"/>
+              <a:t>).</a:t>
+            </a:r>
+          </a:p>
+          <a:p>
+            <a:pPr fontAlgn="base"/>
+            <a:r>
+              <a:rPr lang="en-GB" sz="1100" dirty="0"/>
+              <a:t>Bash has </a:t>
+            </a:r>
+            <a:r>
+              <a:rPr lang="en-GB" sz="1100" dirty="0" err="1"/>
+              <a:t>Csh</a:t>
+            </a:r>
+            <a:r>
+              <a:rPr lang="en-GB" sz="1100" dirty="0"/>
+              <a:t>-style convenience redirection aliases like &amp;| for 2&gt;&amp;1 | and &amp;&gt; for &gt; ... 2&gt;&amp;1</a:t>
+            </a:r>
+          </a:p>
+          <a:p>
+            <a:pPr fontAlgn="base"/>
+            <a:r>
+              <a:rPr lang="en-GB" sz="1100" dirty="0"/>
+              <a:t>Bash supports </a:t>
+            </a:r>
+            <a:r>
+              <a:rPr lang="en-GB" sz="1100" dirty="0" err="1"/>
+              <a:t>coprocesses</a:t>
+            </a:r>
+            <a:r>
+              <a:rPr lang="en-GB" sz="1100" dirty="0"/>
+              <a:t> with &lt;&gt; redirection.</a:t>
+            </a:r>
+          </a:p>
+          <a:p>
+            <a:pPr fontAlgn="base"/>
+            <a:r>
+              <a:rPr lang="en-GB" sz="1100" dirty="0"/>
+              <a:t>Bash features a rich set of expanded non-standard parameter expansions such as ${substring:1:2}, ${variable/pattern/replacement}, case conversion, etc.</a:t>
+            </a:r>
+          </a:p>
+          <a:p>
+            <a:pPr fontAlgn="base"/>
+            <a:r>
+              <a:rPr lang="en-GB" sz="1100" dirty="0"/>
+              <a:t>Bash has significantly extended facilities for shell arithmetic (though still no floating-point support). There is an obsolescent legacy $[expression] syntax which however should be replaced with POSIX arithmetic $((expression)) syntax. (Some legacy pre-POSIX </a:t>
+            </a:r>
+            <a:r>
+              <a:rPr lang="en-GB" sz="1100" dirty="0" err="1"/>
+              <a:t>sh</a:t>
+            </a:r>
+            <a:r>
+              <a:rPr lang="en-GB" sz="1100" dirty="0"/>
+              <a:t> implementations may not support that, though.)</a:t>
+            </a:r>
+          </a:p>
+          <a:p>
+            <a:pPr fontAlgn="base"/>
+            <a:r>
+              <a:rPr lang="en-GB" sz="1100" dirty="0"/>
+              <a:t>Magic variables like $RANDOM, $SECONDS, $PIPESTATUS[@] and $FUNCNAME are Bash extensions.</a:t>
+            </a:r>
+          </a:p>
+          <a:p>
+            <a:pPr fontAlgn="base"/>
+            <a:r>
+              <a:rPr lang="en-GB" sz="1100" dirty="0"/>
+              <a:t>Syntactic differences like export variable=value and [ "x" == "y" ] which are not portable (export variable should be separate from variable assignment, and portable string comparison in [ ... ] uses a single equals sign).</a:t>
+            </a:r>
+          </a:p>
+          <a:p>
+            <a:pPr fontAlgn="base"/>
+            <a:r>
+              <a:rPr lang="en-GB" sz="1100" dirty="0"/>
+              <a:t>Many, many Bash-only extensions to enable or disable optional </a:t>
+            </a:r>
+            <a:r>
+              <a:rPr lang="en-GB" sz="1100" dirty="0" err="1"/>
+              <a:t>behavior</a:t>
+            </a:r>
+            <a:r>
+              <a:rPr lang="en-GB" sz="1100" dirty="0"/>
+              <a:t> and expose internal state of the shell.</a:t>
+            </a:r>
+          </a:p>
+          <a:p>
+            <a:pPr fontAlgn="base"/>
+            <a:r>
+              <a:rPr lang="en-GB" sz="1100" dirty="0"/>
+              <a:t>Many, many convenience features for interactive use which however do not affect script </a:t>
+            </a:r>
+            <a:r>
+              <a:rPr lang="en-GB" sz="1100" dirty="0" err="1"/>
+              <a:t>behavior</a:t>
+            </a:r>
+            <a:r>
+              <a:rPr lang="en-GB" sz="1100" dirty="0"/>
+              <a:t>.</a:t>
+            </a:r>
           </a:p>
         </p:txBody>
       </p:sp>
@@ -22934,6 +23714,84 @@
               <a:t>https://www.youtube.com/watch?v=WVHC5Ggl7k4</a:t>
             </a:r>
             <a:br>
+              <a:rPr lang="en-GB" dirty="0">
+                <a:solidFill>
+                  <a:srgbClr val="444444"/>
+                </a:solidFill>
+                <a:latin typeface="Trebuchet MS"/>
+                <a:cs typeface="Trebuchet MS"/>
+              </a:rPr>
+            </a:br>
+            <a:br>
+              <a:rPr lang="en-GB" dirty="0">
+                <a:solidFill>
+                  <a:srgbClr val="444444"/>
+                </a:solidFill>
+                <a:latin typeface="Trebuchet MS"/>
+                <a:cs typeface="Trebuchet MS"/>
+              </a:rPr>
+            </a:br>
+            <a:endParaRPr lang="en-GB" dirty="0">
+              <a:solidFill>
+                <a:srgbClr val="444444"/>
+              </a:solidFill>
+              <a:latin typeface="Trebuchet MS"/>
+              <a:cs typeface="Trebuchet MS"/>
+            </a:endParaRPr>
+          </a:p>
+          <a:p>
+            <a:pPr marL="285750" indent="-285750">
+              <a:buFont typeface="Arial" panose="020B0604020202020204" pitchFamily="34" charset="0"/>
+              <a:buChar char="•"/>
+            </a:pPr>
+            <a:r>
+              <a:rPr lang="en-GB" dirty="0">
+                <a:solidFill>
+                  <a:srgbClr val="444444"/>
+                </a:solidFill>
+                <a:latin typeface="Trebuchet MS"/>
+                <a:cs typeface="Trebuchet MS"/>
+                <a:hlinkClick r:id="rId4"/>
+              </a:rPr>
+              <a:t>https://github.com/orasul/bash-scripts</a:t>
+            </a:r>
+            <a:endParaRPr lang="en-GB" dirty="0">
+              <a:solidFill>
+                <a:srgbClr val="444444"/>
+              </a:solidFill>
+              <a:latin typeface="Trebuchet MS"/>
+              <a:cs typeface="Trebuchet MS"/>
+            </a:endParaRPr>
+          </a:p>
+          <a:p>
+            <a:pPr marL="285750" indent="-285750">
+              <a:buFont typeface="Arial" panose="020B0604020202020204" pitchFamily="34" charset="0"/>
+              <a:buChar char="•"/>
+            </a:pPr>
+            <a:r>
+              <a:rPr lang="en-GB" dirty="0">
+                <a:solidFill>
+                  <a:srgbClr val="444444"/>
+                </a:solidFill>
+                <a:latin typeface="Trebuchet MS"/>
+                <a:cs typeface="Trebuchet MS"/>
+                <a:hlinkClick r:id="rId5"/>
+              </a:rPr>
+              <a:t>https://github.com/dylanaraps/pure-bash-bible</a:t>
+            </a:r>
+            <a:endParaRPr lang="en-GB" dirty="0">
+              <a:solidFill>
+                <a:srgbClr val="444444"/>
+              </a:solidFill>
+              <a:latin typeface="Trebuchet MS"/>
+              <a:cs typeface="Trebuchet MS"/>
+            </a:endParaRPr>
+          </a:p>
+          <a:p>
+            <a:pPr marL="0" indent="0">
+              <a:buNone/>
+            </a:pPr>
+            <a:br>
               <a:rPr lang="ru-RU" dirty="0">
                 <a:solidFill>
                   <a:srgbClr val="444444"/>
@@ -23040,9 +23898,179 @@
         <p:spPr/>
         <p:txBody>
           <a:bodyPr>
-            <a:normAutofit/>
+            <a:normAutofit fontScale="92500" lnSpcReduction="20000"/>
           </a:bodyPr>
           <a:lstStyle/>
+          <a:p>
+            <a:r>
+              <a:rPr lang="en-GB" b="1" dirty="0"/>
+              <a:t>${parameter}</a:t>
+            </a:r>
+          </a:p>
+          <a:p>
+            <a:r>
+              <a:rPr lang="en-GB" b="1" dirty="0"/>
+              <a:t>${parameter-default}</a:t>
+            </a:r>
+            <a:r>
+              <a:rPr lang="en-GB" dirty="0"/>
+              <a:t>, </a:t>
+            </a:r>
+            <a:r>
+              <a:rPr lang="en-GB" b="1" dirty="0"/>
+              <a:t>${parameter:-default}</a:t>
+            </a:r>
+          </a:p>
+          <a:p>
+            <a:r>
+              <a:rPr lang="en-GB" b="1" dirty="0"/>
+              <a:t>${parameter=default}</a:t>
+            </a:r>
+            <a:r>
+              <a:rPr lang="en-GB" dirty="0"/>
+              <a:t>, </a:t>
+            </a:r>
+            <a:r>
+              <a:rPr lang="en-GB" b="1" dirty="0"/>
+              <a:t>${parameter:=default}</a:t>
+            </a:r>
+          </a:p>
+          <a:p>
+            <a:r>
+              <a:rPr lang="en-GB" b="1" dirty="0"/>
+              <a:t>${</a:t>
+            </a:r>
+            <a:r>
+              <a:rPr lang="en-GB" b="1" dirty="0" err="1"/>
+              <a:t>parameter+alt_value</a:t>
+            </a:r>
+            <a:r>
+              <a:rPr lang="en-GB" b="1" dirty="0"/>
+              <a:t>}</a:t>
+            </a:r>
+            <a:r>
+              <a:rPr lang="en-GB" dirty="0"/>
+              <a:t>, </a:t>
+            </a:r>
+            <a:r>
+              <a:rPr lang="en-GB" b="1" dirty="0"/>
+              <a:t>${parameter:+</a:t>
+            </a:r>
+            <a:r>
+              <a:rPr lang="en-GB" b="1" dirty="0" err="1"/>
+              <a:t>alt_value</a:t>
+            </a:r>
+            <a:r>
+              <a:rPr lang="en-GB" b="1" dirty="0"/>
+              <a:t>}</a:t>
+            </a:r>
+          </a:p>
+          <a:p>
+            <a:r>
+              <a:rPr lang="en-GB" b="1" dirty="0"/>
+              <a:t>${</a:t>
+            </a:r>
+            <a:r>
+              <a:rPr lang="en-GB" b="1" dirty="0" err="1"/>
+              <a:t>parameter?err_msg</a:t>
+            </a:r>
+            <a:r>
+              <a:rPr lang="en-GB" b="1" dirty="0"/>
+              <a:t>}</a:t>
+            </a:r>
+            <a:r>
+              <a:rPr lang="en-GB" dirty="0"/>
+              <a:t>, </a:t>
+            </a:r>
+            <a:r>
+              <a:rPr lang="en-GB" b="1" dirty="0"/>
+              <a:t>${parameter:?</a:t>
+            </a:r>
+            <a:r>
+              <a:rPr lang="en-GB" b="1" dirty="0" err="1"/>
+              <a:t>err_msg</a:t>
+            </a:r>
+            <a:r>
+              <a:rPr lang="en-GB" b="1" dirty="0"/>
+              <a:t>}</a:t>
+            </a:r>
+          </a:p>
+          <a:p>
+            <a:r>
+              <a:rPr lang="en-GB" b="1" dirty="0"/>
+              <a:t>${#var}</a:t>
+            </a:r>
+          </a:p>
+          <a:p>
+            <a:r>
+              <a:rPr lang="en-GB" b="1" dirty="0"/>
+              <a:t>${</a:t>
+            </a:r>
+            <a:r>
+              <a:rPr lang="en-GB" b="1" dirty="0" err="1"/>
+              <a:t>var#Pattern</a:t>
+            </a:r>
+            <a:r>
+              <a:rPr lang="en-GB" b="1" dirty="0"/>
+              <a:t>}</a:t>
+            </a:r>
+            <a:r>
+              <a:rPr lang="en-GB" dirty="0"/>
+              <a:t>, </a:t>
+            </a:r>
+            <a:r>
+              <a:rPr lang="en-GB" b="1" dirty="0"/>
+              <a:t>${var##Pattern}</a:t>
+            </a:r>
+          </a:p>
+          <a:p>
+            <a:r>
+              <a:rPr lang="en-GB" b="1" dirty="0"/>
+              <a:t>${</a:t>
+            </a:r>
+            <a:r>
+              <a:rPr lang="en-GB" b="1" dirty="0" err="1"/>
+              <a:t>var%Pattern</a:t>
+            </a:r>
+            <a:r>
+              <a:rPr lang="en-GB" b="1" dirty="0"/>
+              <a:t>}</a:t>
+            </a:r>
+            <a:r>
+              <a:rPr lang="en-GB" dirty="0"/>
+              <a:t>, </a:t>
+            </a:r>
+            <a:r>
+              <a:rPr lang="en-GB" b="1" dirty="0"/>
+              <a:t>${var%%Pattern}</a:t>
+            </a:r>
+          </a:p>
+          <a:p>
+            <a:r>
+              <a:rPr lang="en-GB" b="1" dirty="0"/>
+              <a:t>${</a:t>
+            </a:r>
+            <a:r>
+              <a:rPr lang="en-GB" b="1" dirty="0" err="1"/>
+              <a:t>var:pos:len</a:t>
+            </a:r>
+            <a:r>
+              <a:rPr lang="en-GB" b="1" dirty="0"/>
+              <a:t>}</a:t>
+            </a:r>
+          </a:p>
+          <a:p>
+            <a:r>
+              <a:rPr lang="en-GB" b="1" dirty="0"/>
+              <a:t>${var/Pattern/Replacement}</a:t>
+            </a:r>
+          </a:p>
+          <a:p>
+            <a:r>
+              <a:rPr lang="en-GB" b="1" dirty="0"/>
+              <a:t>${var//Pattern/Replacement}</a:t>
+            </a:r>
+          </a:p>
           <a:p>
             <a:endParaRPr lang="en-US" dirty="0"/>
           </a:p>
@@ -23073,7 +24101,58 @@
               <a:rPr lang="ru-RU" dirty="0"/>
               <a:t>Переменные</a:t>
             </a:r>
-            <a:endParaRPr lang="en-US" dirty="0"/>
+            <a:r>
+              <a:rPr lang="en-US" dirty="0"/>
+              <a:t> </a:t>
+            </a:r>
+          </a:p>
+        </p:txBody>
+      </p:sp>
+      <p:sp>
+        <p:nvSpPr>
+          <p:cNvPr id="4" name="TextBox 3">
+            <a:extLst>
+              <a:ext uri="{FF2B5EF4-FFF2-40B4-BE49-F238E27FC236}">
+                <a16:creationId xmlns:a16="http://schemas.microsoft.com/office/drawing/2014/main" id="{B1AC65CF-8187-354D-94CD-28064CB55450}"/>
+              </a:ext>
+            </a:extLst>
+          </p:cNvPr>
+          <p:cNvSpPr txBox="1"/>
+          <p:nvPr/>
+        </p:nvSpPr>
+        <p:spPr>
+          <a:xfrm>
+            <a:off x="3621974" y="281678"/>
+            <a:ext cx="5775492" cy="369332"/>
+          </a:xfrm>
+          <a:prstGeom prst="rect">
+            <a:avLst/>
+          </a:prstGeom>
+          <a:noFill/>
+        </p:spPr>
+        <p:txBody>
+          <a:bodyPr wrap="none" rtlCol="0">
+            <a:spAutoFit/>
+          </a:bodyPr>
+          <a:lstStyle/>
+          <a:p>
+            <a:r>
+              <a:rPr lang="en-GB" dirty="0"/>
+              <a:t>https://</a:t>
+            </a:r>
+            <a:r>
+              <a:rPr lang="en-GB" dirty="0" err="1"/>
+              <a:t>tldp.org</a:t>
+            </a:r>
+            <a:r>
+              <a:rPr lang="en-GB" dirty="0"/>
+              <a:t>/LDP/abs/html/parameter-</a:t>
+            </a:r>
+            <a:r>
+              <a:rPr lang="en-GB" dirty="0" err="1"/>
+              <a:t>substitution.html</a:t>
+            </a:r>
+            <a:endParaRPr lang="en-RU" dirty="0"/>
           </a:p>
         </p:txBody>
       </p:sp>
@@ -23109,33 +24188,6 @@
       </p:grpSpPr>
       <p:sp>
         <p:nvSpPr>
-          <p:cNvPr id="2" name="Content Placeholder 1">
-            <a:extLst>
-              <a:ext uri="{FF2B5EF4-FFF2-40B4-BE49-F238E27FC236}">
-                <a16:creationId xmlns:a16="http://schemas.microsoft.com/office/drawing/2014/main" id="{5BA0F083-B66A-4CF4-8CE4-B01CF146F152}"/>
-              </a:ext>
-            </a:extLst>
-          </p:cNvPr>
-          <p:cNvSpPr>
-            <a:spLocks noGrp="1"/>
-          </p:cNvSpPr>
-          <p:nvPr>
-            <p:ph idx="1"/>
-          </p:nvPr>
-        </p:nvSpPr>
-        <p:spPr/>
-        <p:txBody>
-          <a:bodyPr>
-            <a:normAutofit/>
-          </a:bodyPr>
-          <a:lstStyle/>
-          <a:p>
-            <a:endParaRPr lang="en-US" dirty="0"/>
-          </a:p>
-        </p:txBody>
-      </p:sp>
-      <p:sp>
-        <p:nvSpPr>
           <p:cNvPr id="3" name="Text Placeholder 2">
             <a:extLst>
               <a:ext uri="{FF2B5EF4-FFF2-40B4-BE49-F238E27FC236}">
@@ -23160,6 +24212,251 @@
               <a:t>Циклы</a:t>
             </a:r>
             <a:endParaRPr lang="en-US" dirty="0"/>
+          </a:p>
+        </p:txBody>
+      </p:sp>
+      <p:sp>
+        <p:nvSpPr>
+          <p:cNvPr id="4" name="TextBox 3">
+            <a:extLst>
+              <a:ext uri="{FF2B5EF4-FFF2-40B4-BE49-F238E27FC236}">
+                <a16:creationId xmlns:a16="http://schemas.microsoft.com/office/drawing/2014/main" id="{A58C088F-467A-AC4C-91DE-953344752DBB}"/>
+              </a:ext>
+            </a:extLst>
+          </p:cNvPr>
+          <p:cNvSpPr txBox="1"/>
+          <p:nvPr/>
+        </p:nvSpPr>
+        <p:spPr>
+          <a:xfrm>
+            <a:off x="1116281" y="1448790"/>
+            <a:ext cx="3942607" cy="1754326"/>
+          </a:xfrm>
+          <a:prstGeom prst="rect">
+            <a:avLst/>
+          </a:prstGeom>
+          <a:noFill/>
+        </p:spPr>
+        <p:txBody>
+          <a:bodyPr wrap="square" rtlCol="0">
+            <a:spAutoFit/>
+          </a:bodyPr>
+          <a:lstStyle/>
+          <a:p>
+            <a:r>
+              <a:rPr lang="en-GB" b="1" dirty="0"/>
+              <a:t>for</a:t>
+            </a:r>
+            <a:r>
+              <a:rPr lang="en-GB" dirty="0"/>
+              <a:t> VARIABLE </a:t>
+            </a:r>
+            <a:r>
+              <a:rPr lang="en-GB" b="1" dirty="0"/>
+              <a:t>in</a:t>
+            </a:r>
+            <a:r>
+              <a:rPr lang="en-GB" dirty="0"/>
+              <a:t> file1 file2 file3</a:t>
+            </a:r>
+            <a:br>
+              <a:rPr lang="en-GB" dirty="0"/>
+            </a:br>
+            <a:r>
+              <a:rPr lang="en-GB" b="1" dirty="0"/>
+              <a:t>do</a:t>
+            </a:r>
+            <a:br>
+              <a:rPr lang="en-GB" b="1" dirty="0"/>
+            </a:br>
+            <a:r>
+              <a:rPr lang="en-GB" b="1" dirty="0"/>
+              <a:t>    </a:t>
+            </a:r>
+            <a:r>
+              <a:rPr lang="en-GB" dirty="0"/>
+              <a:t>command1 on $VARIABLE</a:t>
+            </a:r>
+            <a:br>
+              <a:rPr lang="en-GB" dirty="0"/>
+            </a:br>
+            <a:r>
+              <a:rPr lang="en-GB" dirty="0"/>
+              <a:t>    command2</a:t>
+            </a:r>
+            <a:br>
+              <a:rPr lang="en-GB" dirty="0"/>
+            </a:br>
+            <a:r>
+              <a:rPr lang="en-GB" dirty="0"/>
+              <a:t>    command</a:t>
+            </a:r>
+            <a:br>
+              <a:rPr lang="en-GB" dirty="0"/>
+            </a:br>
+            <a:r>
+              <a:rPr lang="en-GB" b="1" dirty="0"/>
+              <a:t>done</a:t>
+            </a:r>
+            <a:endParaRPr lang="en-RU" dirty="0"/>
+          </a:p>
+        </p:txBody>
+      </p:sp>
+      <p:sp>
+        <p:nvSpPr>
+          <p:cNvPr id="5" name="TextBox 4">
+            <a:extLst>
+              <a:ext uri="{FF2B5EF4-FFF2-40B4-BE49-F238E27FC236}">
+                <a16:creationId xmlns:a16="http://schemas.microsoft.com/office/drawing/2014/main" id="{FBD8698D-E3E2-D443-B054-1DF3C4249D75}"/>
+              </a:ext>
+            </a:extLst>
+          </p:cNvPr>
+          <p:cNvSpPr txBox="1"/>
+          <p:nvPr/>
+        </p:nvSpPr>
+        <p:spPr>
+          <a:xfrm>
+            <a:off x="6398821" y="1446811"/>
+            <a:ext cx="3942607" cy="1754326"/>
+          </a:xfrm>
+          <a:prstGeom prst="rect">
+            <a:avLst/>
+          </a:prstGeom>
+          <a:noFill/>
+        </p:spPr>
+        <p:txBody>
+          <a:bodyPr wrap="square" rtlCol="0">
+            <a:spAutoFit/>
+          </a:bodyPr>
+          <a:lstStyle/>
+          <a:p>
+            <a:r>
+              <a:rPr lang="en-GB" b="1" dirty="0"/>
+              <a:t>while </a:t>
+            </a:r>
+            <a:r>
+              <a:rPr lang="en-US" b="1" dirty="0"/>
+              <a:t>command</a:t>
+            </a:r>
+            <a:br>
+              <a:rPr lang="en-GB" dirty="0"/>
+            </a:br>
+            <a:r>
+              <a:rPr lang="en-GB" b="1" dirty="0"/>
+              <a:t>do</a:t>
+            </a:r>
+            <a:br>
+              <a:rPr lang="en-GB" b="1" dirty="0"/>
+            </a:br>
+            <a:r>
+              <a:rPr lang="en-GB" b="1" dirty="0"/>
+              <a:t>    </a:t>
+            </a:r>
+            <a:r>
+              <a:rPr lang="en-GB" dirty="0"/>
+              <a:t>echo a</a:t>
+            </a:r>
+            <a:br>
+              <a:rPr lang="en-GB" dirty="0"/>
+            </a:br>
+            <a:r>
+              <a:rPr lang="en-GB" dirty="0"/>
+              <a:t>    a=a+1</a:t>
+            </a:r>
+            <a:br>
+              <a:rPr lang="en-GB" dirty="0"/>
+            </a:br>
+            <a:r>
+              <a:rPr lang="en-GB" dirty="0"/>
+              <a:t>    echo ok</a:t>
+            </a:r>
+            <a:br>
+              <a:rPr lang="en-GB" dirty="0"/>
+            </a:br>
+            <a:r>
+              <a:rPr lang="en-GB" b="1" dirty="0"/>
+              <a:t>done</a:t>
+            </a:r>
+            <a:endParaRPr lang="en-RU" dirty="0"/>
+          </a:p>
+        </p:txBody>
+      </p:sp>
+      <p:sp>
+        <p:nvSpPr>
+          <p:cNvPr id="6" name="TextBox 5">
+            <a:extLst>
+              <a:ext uri="{FF2B5EF4-FFF2-40B4-BE49-F238E27FC236}">
+                <a16:creationId xmlns:a16="http://schemas.microsoft.com/office/drawing/2014/main" id="{964DC12E-8D57-DC4F-BBEA-AD4D75D76564}"/>
+              </a:ext>
+            </a:extLst>
+          </p:cNvPr>
+          <p:cNvSpPr txBox="1"/>
+          <p:nvPr/>
+        </p:nvSpPr>
+        <p:spPr>
+          <a:xfrm>
+            <a:off x="1116280" y="4205251"/>
+            <a:ext cx="3942607" cy="1754326"/>
+          </a:xfrm>
+          <a:prstGeom prst="rect">
+            <a:avLst/>
+          </a:prstGeom>
+          <a:noFill/>
+        </p:spPr>
+        <p:txBody>
+          <a:bodyPr wrap="square" rtlCol="0">
+            <a:spAutoFit/>
+          </a:bodyPr>
+          <a:lstStyle/>
+          <a:p>
+            <a:r>
+              <a:rPr lang="en-GB" b="1" dirty="0"/>
+              <a:t>until </a:t>
+            </a:r>
+            <a:r>
+              <a:rPr lang="en-US" b="1" dirty="0"/>
+              <a:t>command</a:t>
+            </a:r>
+            <a:br>
+              <a:rPr lang="en-GB" dirty="0"/>
+            </a:br>
+            <a:r>
+              <a:rPr lang="en-GB" b="1" dirty="0"/>
+              <a:t>do</a:t>
+            </a:r>
+            <a:br>
+              <a:rPr lang="en-GB" b="1" dirty="0"/>
+            </a:br>
+            <a:r>
+              <a:rPr lang="en-GB" b="1" dirty="0"/>
+              <a:t>    </a:t>
+            </a:r>
+            <a:r>
+              <a:rPr lang="en-GB" dirty="0"/>
+              <a:t>echo a</a:t>
+            </a:r>
+            <a:br>
+              <a:rPr lang="en-GB" dirty="0"/>
+            </a:br>
+            <a:r>
+              <a:rPr lang="en-GB" dirty="0"/>
+              <a:t>    a=a+1</a:t>
+            </a:r>
+            <a:br>
+              <a:rPr lang="en-GB" dirty="0"/>
+            </a:br>
+            <a:r>
+              <a:rPr lang="en-GB" dirty="0"/>
+              <a:t>    echo ok</a:t>
+            </a:r>
+            <a:br>
+              <a:rPr lang="en-GB" dirty="0"/>
+            </a:br>
+            <a:r>
+              <a:rPr lang="en-GB" b="1" dirty="0"/>
+              <a:t>done</a:t>
+            </a:r>
+            <a:endParaRPr lang="en-RU" dirty="0"/>
           </a:p>
         </p:txBody>
       </p:sp>
@@ -23195,33 +24492,6 @@
       </p:grpSpPr>
       <p:sp>
         <p:nvSpPr>
-          <p:cNvPr id="2" name="Content Placeholder 1">
-            <a:extLst>
-              <a:ext uri="{FF2B5EF4-FFF2-40B4-BE49-F238E27FC236}">
-                <a16:creationId xmlns:a16="http://schemas.microsoft.com/office/drawing/2014/main" id="{5BA0F083-B66A-4CF4-8CE4-B01CF146F152}"/>
-              </a:ext>
-            </a:extLst>
-          </p:cNvPr>
-          <p:cNvSpPr>
-            <a:spLocks noGrp="1"/>
-          </p:cNvSpPr>
-          <p:nvPr>
-            <p:ph idx="1"/>
-          </p:nvPr>
-        </p:nvSpPr>
-        <p:spPr/>
-        <p:txBody>
-          <a:bodyPr>
-            <a:normAutofit/>
-          </a:bodyPr>
-          <a:lstStyle/>
-          <a:p>
-            <a:endParaRPr lang="en-US" dirty="0"/>
-          </a:p>
-        </p:txBody>
-      </p:sp>
-      <p:sp>
-        <p:nvSpPr>
           <p:cNvPr id="3" name="Text Placeholder 2">
             <a:extLst>
               <a:ext uri="{FF2B5EF4-FFF2-40B4-BE49-F238E27FC236}">
@@ -23246,6 +24516,115 @@
               <a:t>Функции</a:t>
             </a:r>
             <a:endParaRPr lang="en-US" dirty="0"/>
+          </a:p>
+        </p:txBody>
+      </p:sp>
+      <p:sp>
+        <p:nvSpPr>
+          <p:cNvPr id="4" name="TextBox 3">
+            <a:extLst>
+              <a:ext uri="{FF2B5EF4-FFF2-40B4-BE49-F238E27FC236}">
+                <a16:creationId xmlns:a16="http://schemas.microsoft.com/office/drawing/2014/main" id="{2D21DD82-12D2-534E-9652-AF181FA689B8}"/>
+              </a:ext>
+            </a:extLst>
+          </p:cNvPr>
+          <p:cNvSpPr txBox="1"/>
+          <p:nvPr/>
+        </p:nvSpPr>
+        <p:spPr>
+          <a:xfrm>
+            <a:off x="380010" y="1413164"/>
+            <a:ext cx="1811714" cy="1200329"/>
+          </a:xfrm>
+          <a:prstGeom prst="rect">
+            <a:avLst/>
+          </a:prstGeom>
+          <a:noFill/>
+        </p:spPr>
+        <p:txBody>
+          <a:bodyPr wrap="none" rtlCol="0">
+            <a:spAutoFit/>
+          </a:bodyPr>
+          <a:lstStyle/>
+          <a:p>
+            <a:r>
+              <a:rPr lang="en-GB" dirty="0" err="1"/>
+              <a:t>function_name</a:t>
+            </a:r>
+            <a:r>
+              <a:rPr lang="en-GB" dirty="0"/>
+              <a:t> ()</a:t>
+            </a:r>
+            <a:br>
+              <a:rPr lang="en-GB" dirty="0"/>
+            </a:br>
+            <a:r>
+              <a:rPr lang="en-GB" dirty="0"/>
+              <a:t>{</a:t>
+            </a:r>
+            <a:br>
+              <a:rPr lang="en-GB" dirty="0"/>
+            </a:br>
+            <a:r>
+              <a:rPr lang="en-GB" dirty="0"/>
+              <a:t>    commands</a:t>
+            </a:r>
+            <a:br>
+              <a:rPr lang="en-GB" dirty="0"/>
+            </a:br>
+            <a:r>
+              <a:rPr lang="en-GB" dirty="0"/>
+              <a:t>}</a:t>
+            </a:r>
+            <a:endParaRPr lang="en-RU" dirty="0"/>
+          </a:p>
+        </p:txBody>
+      </p:sp>
+      <p:sp>
+        <p:nvSpPr>
+          <p:cNvPr id="5" name="TextBox 4">
+            <a:extLst>
+              <a:ext uri="{FF2B5EF4-FFF2-40B4-BE49-F238E27FC236}">
+                <a16:creationId xmlns:a16="http://schemas.microsoft.com/office/drawing/2014/main" id="{1D9FE6E6-057D-2B4C-A311-DC807B976451}"/>
+              </a:ext>
+            </a:extLst>
+          </p:cNvPr>
+          <p:cNvSpPr txBox="1"/>
+          <p:nvPr/>
+        </p:nvSpPr>
+        <p:spPr>
+          <a:xfrm>
+            <a:off x="3206338" y="1413164"/>
+            <a:ext cx="4007507" cy="369332"/>
+          </a:xfrm>
+          <a:prstGeom prst="rect">
+            <a:avLst/>
+          </a:prstGeom>
+          <a:noFill/>
+        </p:spPr>
+        <p:txBody>
+          <a:bodyPr wrap="none" rtlCol="0">
+            <a:spAutoFit/>
+          </a:bodyPr>
+          <a:lstStyle/>
+          <a:p>
+            <a:r>
+              <a:rPr lang="en-GB" b="1" dirty="0"/>
+              <a:t>function</a:t>
+            </a:r>
+            <a:r>
+              <a:rPr lang="en-GB" dirty="0"/>
+              <a:t> </a:t>
+            </a:r>
+            <a:r>
+              <a:rPr lang="en-GB" dirty="0" err="1"/>
+              <a:t>function_name</a:t>
+            </a:r>
+            <a:r>
+              <a:rPr lang="en-GB" dirty="0"/>
+              <a:t> { commands; }</a:t>
+            </a:r>
+            <a:endParaRPr lang="en-RU" dirty="0"/>
           </a:p>
         </p:txBody>
       </p:sp>
@@ -23281,33 +24660,6 @@
       </p:grpSpPr>
       <p:sp>
         <p:nvSpPr>
-          <p:cNvPr id="2" name="Content Placeholder 1">
-            <a:extLst>
-              <a:ext uri="{FF2B5EF4-FFF2-40B4-BE49-F238E27FC236}">
-                <a16:creationId xmlns:a16="http://schemas.microsoft.com/office/drawing/2014/main" id="{5BA0F083-B66A-4CF4-8CE4-B01CF146F152}"/>
-              </a:ext>
-            </a:extLst>
-          </p:cNvPr>
-          <p:cNvSpPr>
-            <a:spLocks noGrp="1"/>
-          </p:cNvSpPr>
-          <p:nvPr>
-            <p:ph idx="1"/>
-          </p:nvPr>
-        </p:nvSpPr>
-        <p:spPr/>
-        <p:txBody>
-          <a:bodyPr>
-            <a:normAutofit/>
-          </a:bodyPr>
-          <a:lstStyle/>
-          <a:p>
-            <a:endParaRPr lang="en-US" dirty="0"/>
-          </a:p>
-        </p:txBody>
-      </p:sp>
-      <p:sp>
-        <p:nvSpPr>
           <p:cNvPr id="3" name="Text Placeholder 2">
             <a:extLst>
               <a:ext uri="{FF2B5EF4-FFF2-40B4-BE49-F238E27FC236}">
@@ -23332,6 +24684,151 @@
               <a:t>Ветвление</a:t>
             </a:r>
             <a:endParaRPr lang="en-US" dirty="0"/>
+          </a:p>
+        </p:txBody>
+      </p:sp>
+      <p:sp>
+        <p:nvSpPr>
+          <p:cNvPr id="4" name="TextBox 3">
+            <a:extLst>
+              <a:ext uri="{FF2B5EF4-FFF2-40B4-BE49-F238E27FC236}">
+                <a16:creationId xmlns:a16="http://schemas.microsoft.com/office/drawing/2014/main" id="{F6FCF691-ABC4-4D4A-958C-9AD191AF034E}"/>
+              </a:ext>
+            </a:extLst>
+          </p:cNvPr>
+          <p:cNvSpPr txBox="1"/>
+          <p:nvPr/>
+        </p:nvSpPr>
+        <p:spPr>
+          <a:xfrm>
+            <a:off x="712519" y="1246909"/>
+            <a:ext cx="9108375" cy="4524315"/>
+          </a:xfrm>
+          <a:prstGeom prst="rect">
+            <a:avLst/>
+          </a:prstGeom>
+          <a:noFill/>
+        </p:spPr>
+        <p:txBody>
+          <a:bodyPr wrap="square" rtlCol="0">
+            <a:spAutoFit/>
+          </a:bodyPr>
+          <a:lstStyle/>
+          <a:p>
+            <a:r>
+              <a:rPr lang="en-GB" dirty="0"/>
+              <a:t>command1 &amp;&amp; </a:t>
+            </a:r>
+            <a:r>
+              <a:rPr lang="en-GB" dirty="0" err="1"/>
+              <a:t>truecommand</a:t>
+            </a:r>
+            <a:r>
+              <a:rPr lang="en-GB" dirty="0"/>
+              <a:t> || </a:t>
+            </a:r>
+            <a:r>
+              <a:rPr lang="en-GB" dirty="0" err="1"/>
+              <a:t>falsecommand</a:t>
+            </a:r>
+            <a:r>
+              <a:rPr lang="en-GB" dirty="0"/>
+              <a:t> </a:t>
+            </a:r>
+            <a:br>
+              <a:rPr lang="en-GB" dirty="0"/>
+            </a:br>
+            <a:br>
+              <a:rPr lang="en-GB" dirty="0"/>
+            </a:br>
+            <a:endParaRPr lang="en-GB" dirty="0"/>
+          </a:p>
+          <a:p>
+            <a:endParaRPr lang="en-GB" dirty="0"/>
+          </a:p>
+          <a:p>
+            <a:br>
+              <a:rPr lang="en-GB" dirty="0"/>
+            </a:br>
+            <a:r>
+              <a:rPr lang="en-GB" dirty="0"/>
+              <a:t>if [ conditional expression1 ]</a:t>
+            </a:r>
+            <a:br>
+              <a:rPr lang="en-GB" dirty="0"/>
+            </a:br>
+            <a:r>
+              <a:rPr lang="en-GB" dirty="0"/>
+              <a:t>then</a:t>
+            </a:r>
+            <a:br>
+              <a:rPr lang="en-GB" dirty="0"/>
+            </a:br>
+            <a:r>
+              <a:rPr lang="en-GB" dirty="0"/>
+              <a:t>     statement1</a:t>
+            </a:r>
+            <a:br>
+              <a:rPr lang="en-GB" dirty="0"/>
+            </a:br>
+            <a:r>
+              <a:rPr lang="en-GB" dirty="0"/>
+              <a:t>     statement2</a:t>
+            </a:r>
+            <a:br>
+              <a:rPr lang="en-GB" dirty="0"/>
+            </a:br>
+            <a:r>
+              <a:rPr lang="en-GB" dirty="0" err="1"/>
+              <a:t>elif</a:t>
+            </a:r>
+            <a:r>
+              <a:rPr lang="en-GB" dirty="0"/>
+              <a:t> [ conditional expression2 ]</a:t>
+            </a:r>
+            <a:br>
+              <a:rPr lang="en-GB" dirty="0"/>
+            </a:br>
+            <a:r>
+              <a:rPr lang="en-GB" dirty="0"/>
+              <a:t>then</a:t>
+            </a:r>
+            <a:br>
+              <a:rPr lang="en-GB" dirty="0"/>
+            </a:br>
+            <a:r>
+              <a:rPr lang="en-GB" dirty="0"/>
+              <a:t>     statement3</a:t>
+            </a:r>
+            <a:br>
+              <a:rPr lang="en-GB" dirty="0"/>
+            </a:br>
+            <a:r>
+              <a:rPr lang="en-GB" dirty="0"/>
+              <a:t>     statement4</a:t>
+            </a:r>
+            <a:br>
+              <a:rPr lang="en-GB" dirty="0"/>
+            </a:br>
+            <a:r>
+              <a:rPr lang="en-GB" dirty="0"/>
+              <a:t>else</a:t>
+            </a:r>
+            <a:br>
+              <a:rPr lang="en-GB" dirty="0"/>
+            </a:br>
+            <a:r>
+              <a:rPr lang="en-GB" dirty="0"/>
+              <a:t>     statement5</a:t>
+            </a:r>
+            <a:br>
+              <a:rPr lang="en-GB" dirty="0"/>
+            </a:br>
+            <a:r>
+              <a:rPr lang="en-GB" dirty="0"/>
+              <a:t>fi</a:t>
+            </a:r>
+            <a:endParaRPr lang="en-RU" dirty="0"/>
           </a:p>
         </p:txBody>
       </p:sp>
@@ -23367,33 +24864,6 @@
       </p:grpSpPr>
       <p:sp>
         <p:nvSpPr>
-          <p:cNvPr id="2" name="Content Placeholder 1">
-            <a:extLst>
-              <a:ext uri="{FF2B5EF4-FFF2-40B4-BE49-F238E27FC236}">
-                <a16:creationId xmlns:a16="http://schemas.microsoft.com/office/drawing/2014/main" id="{5BA0F083-B66A-4CF4-8CE4-B01CF146F152}"/>
-              </a:ext>
-            </a:extLst>
-          </p:cNvPr>
-          <p:cNvSpPr>
-            <a:spLocks noGrp="1"/>
-          </p:cNvSpPr>
-          <p:nvPr>
-            <p:ph idx="1"/>
-          </p:nvPr>
-        </p:nvSpPr>
-        <p:spPr/>
-        <p:txBody>
-          <a:bodyPr>
-            <a:normAutofit/>
-          </a:bodyPr>
-          <a:lstStyle/>
-          <a:p>
-            <a:endParaRPr lang="en-US" dirty="0"/>
-          </a:p>
-        </p:txBody>
-      </p:sp>
-      <p:sp>
-        <p:nvSpPr>
           <p:cNvPr id="3" name="Text Placeholder 2">
             <a:extLst>
               <a:ext uri="{FF2B5EF4-FFF2-40B4-BE49-F238E27FC236}">
@@ -23418,6 +24888,239 @@
               <a:t>Ветвление</a:t>
             </a:r>
             <a:endParaRPr lang="en-US" dirty="0"/>
+          </a:p>
+        </p:txBody>
+      </p:sp>
+      <p:sp>
+        <p:nvSpPr>
+          <p:cNvPr id="4" name="TextBox 3">
+            <a:extLst>
+              <a:ext uri="{FF2B5EF4-FFF2-40B4-BE49-F238E27FC236}">
+                <a16:creationId xmlns:a16="http://schemas.microsoft.com/office/drawing/2014/main" id="{F4081CD9-3261-0B43-9A79-6E4365147F95}"/>
+              </a:ext>
+            </a:extLst>
+          </p:cNvPr>
+          <p:cNvSpPr txBox="1"/>
+          <p:nvPr/>
+        </p:nvSpPr>
+        <p:spPr>
+          <a:xfrm>
+            <a:off x="377190" y="1165860"/>
+            <a:ext cx="10611015" cy="5405009"/>
+          </a:xfrm>
+          <a:prstGeom prst="rect">
+            <a:avLst/>
+          </a:prstGeom>
+          <a:noFill/>
+        </p:spPr>
+        <p:txBody>
+          <a:bodyPr wrap="square" rtlCol="0">
+            <a:spAutoFit/>
+          </a:bodyPr>
+          <a:lstStyle/>
+          <a:p>
+            <a:r>
+              <a:rPr lang="en-GB" sz="1400" dirty="0"/>
+              <a:t>case "$1" in</a:t>
+            </a:r>
+            <a:br>
+              <a:rPr lang="en-GB" sz="1400" dirty="0"/>
+            </a:br>
+            <a:r>
+              <a:rPr lang="en-GB" sz="1400" dirty="0"/>
+              <a:t>        start)</a:t>
+            </a:r>
+            <a:br>
+              <a:rPr lang="en-GB" sz="1400" dirty="0"/>
+            </a:br>
+            <a:r>
+              <a:rPr lang="en-GB" sz="1400" dirty="0"/>
+              <a:t>              start</a:t>
+            </a:r>
+            <a:br>
+              <a:rPr lang="en-GB" sz="1400" dirty="0"/>
+            </a:br>
+            <a:r>
+              <a:rPr lang="en-GB" sz="1400" dirty="0"/>
+              <a:t>              ;;</a:t>
+            </a:r>
+            <a:br>
+              <a:rPr lang="en-GB" sz="1400" dirty="0"/>
+            </a:br>
+            <a:r>
+              <a:rPr lang="en-GB" sz="1400" dirty="0"/>
+              <a:t>        stop)</a:t>
+            </a:r>
+            <a:br>
+              <a:rPr lang="en-GB" sz="1400" dirty="0"/>
+            </a:br>
+            <a:r>
+              <a:rPr lang="en-GB" sz="1400" dirty="0"/>
+              <a:t>              stop</a:t>
+            </a:r>
+            <a:br>
+              <a:rPr lang="en-GB" sz="1400" dirty="0"/>
+            </a:br>
+            <a:r>
+              <a:rPr lang="en-GB" sz="1400" dirty="0"/>
+              <a:t>              ;;</a:t>
+            </a:r>
+            <a:br>
+              <a:rPr lang="en-GB" sz="1400" dirty="0"/>
+            </a:br>
+            <a:r>
+              <a:rPr lang="en-GB" sz="1400" dirty="0"/>
+              <a:t>        status)</a:t>
+            </a:r>
+            <a:br>
+              <a:rPr lang="en-GB" sz="1400" dirty="0"/>
+            </a:br>
+            <a:r>
+              <a:rPr lang="en-GB" sz="1400" dirty="0"/>
+              <a:t>              status </a:t>
+            </a:r>
+            <a:r>
+              <a:rPr lang="en-GB" sz="1400" dirty="0" err="1"/>
+              <a:t>anacron</a:t>
+            </a:r>
+            <a:br>
+              <a:rPr lang="en-GB" sz="1400" dirty="0"/>
+            </a:br>
+            <a:r>
+              <a:rPr lang="en-GB" sz="1400" dirty="0"/>
+              <a:t>              ;;</a:t>
+            </a:r>
+            <a:br>
+              <a:rPr lang="en-GB" sz="1400" dirty="0"/>
+            </a:br>
+            <a:r>
+              <a:rPr lang="en-GB" sz="1400" dirty="0"/>
+              <a:t>        restart)</a:t>
+            </a:r>
+            <a:br>
+              <a:rPr lang="en-GB" sz="1400" dirty="0"/>
+            </a:br>
+            <a:r>
+              <a:rPr lang="en-GB" sz="1400" dirty="0"/>
+              <a:t>              stop</a:t>
+            </a:r>
+            <a:br>
+              <a:rPr lang="en-GB" sz="1400" dirty="0"/>
+            </a:br>
+            <a:r>
+              <a:rPr lang="en-GB" sz="1400" dirty="0"/>
+              <a:t>              start</a:t>
+            </a:r>
+            <a:br>
+              <a:rPr lang="en-GB" sz="1400" dirty="0"/>
+            </a:br>
+            <a:r>
+              <a:rPr lang="en-GB" sz="1400" dirty="0"/>
+              <a:t>              ;;</a:t>
+            </a:r>
+            <a:br>
+              <a:rPr lang="en-GB" sz="1400" dirty="0"/>
+            </a:br>
+            <a:r>
+              <a:rPr lang="en-GB" sz="1400" dirty="0"/>
+              <a:t>        </a:t>
+            </a:r>
+            <a:r>
+              <a:rPr lang="en-GB" sz="1400" dirty="0" err="1"/>
+              <a:t>condrestart</a:t>
+            </a:r>
+            <a:r>
+              <a:rPr lang="en-GB" sz="1400" dirty="0"/>
+              <a:t>)</a:t>
+            </a:r>
+            <a:br>
+              <a:rPr lang="en-GB" sz="1400" dirty="0"/>
+            </a:br>
+            <a:r>
+              <a:rPr lang="en-GB" sz="1400" dirty="0"/>
+              <a:t>              if test "</a:t>
+            </a:r>
+            <a:r>
+              <a:rPr lang="en-GB" sz="1400" dirty="0" err="1"/>
+              <a:t>x`pidof</a:t>
+            </a:r>
+            <a:r>
+              <a:rPr lang="en-GB" sz="1400" dirty="0"/>
+              <a:t> </a:t>
+            </a:r>
+            <a:r>
+              <a:rPr lang="en-GB" sz="1400" dirty="0" err="1"/>
+              <a:t>anacron</a:t>
+            </a:r>
+            <a:r>
+              <a:rPr lang="en-GB" sz="1400" dirty="0"/>
+              <a:t>`" != x; then</a:t>
+            </a:r>
+            <a:br>
+              <a:rPr lang="en-GB" sz="1400" dirty="0"/>
+            </a:br>
+            <a:r>
+              <a:rPr lang="en-GB" sz="1400" dirty="0"/>
+              <a:t>                    stop</a:t>
+            </a:r>
+            <a:br>
+              <a:rPr lang="en-GB" sz="1400" dirty="0"/>
+            </a:br>
+            <a:r>
+              <a:rPr lang="en-GB" sz="1400" dirty="0"/>
+              <a:t>                    start</a:t>
+            </a:r>
+            <a:br>
+              <a:rPr lang="en-GB" sz="1400" dirty="0"/>
+            </a:br>
+            <a:r>
+              <a:rPr lang="en-GB" sz="1400" dirty="0"/>
+              <a:t>              fi</a:t>
+            </a:r>
+            <a:br>
+              <a:rPr lang="en-GB" sz="1400" dirty="0"/>
+            </a:br>
+            <a:r>
+              <a:rPr lang="en-GB" sz="1400" dirty="0"/>
+              <a:t>              ;;</a:t>
+            </a:r>
+            <a:br>
+              <a:rPr lang="en-GB" sz="1400" dirty="0"/>
+            </a:br>
+            <a:r>
+              <a:rPr lang="en-GB" sz="1400" dirty="0"/>
+              <a:t>        *)</a:t>
+            </a:r>
+            <a:br>
+              <a:rPr lang="en-GB" sz="1400" dirty="0"/>
+            </a:br>
+            <a:r>
+              <a:rPr lang="en-GB" sz="1400" dirty="0"/>
+              <a:t>              echo $"Usage: $0 {</a:t>
+            </a:r>
+            <a:r>
+              <a:rPr lang="en-GB" sz="1400" dirty="0" err="1"/>
+              <a:t>start|stop|restart|condrestart|status</a:t>
+            </a:r>
+            <a:r>
+              <a:rPr lang="en-GB" sz="1400" dirty="0"/>
+              <a:t>}”</a:t>
+            </a:r>
+            <a:br>
+              <a:rPr lang="en-GB" sz="1400" dirty="0"/>
+            </a:br>
+            <a:r>
+              <a:rPr lang="en-GB" sz="1400" dirty="0"/>
+              <a:t>              exit 1</a:t>
+            </a:r>
+            <a:br>
+              <a:rPr lang="en-GB" sz="1400" dirty="0"/>
+            </a:br>
+            <a:r>
+              <a:rPr lang="en-GB" sz="1400" dirty="0" err="1"/>
+              <a:t>esac</a:t>
+            </a:r>
+            <a:endParaRPr lang="en-RU" sz="1400" dirty="0"/>
           </a:p>
         </p:txBody>
       </p:sp>
@@ -23467,14 +25170,40 @@
             <p:ph idx="1"/>
           </p:nvPr>
         </p:nvSpPr>
-        <p:spPr/>
+        <p:spPr>
+          <a:xfrm>
+            <a:off x="480484" y="1439865"/>
+            <a:ext cx="10392925" cy="1621388"/>
+          </a:xfrm>
+        </p:spPr>
         <p:txBody>
           <a:bodyPr>
-            <a:normAutofit/>
+            <a:normAutofit fontScale="92500" lnSpcReduction="10000"/>
           </a:bodyPr>
           <a:lstStyle/>
           <a:p>
-            <a:endParaRPr lang="en-US" dirty="0"/>
+            <a:r>
+              <a:rPr lang="en-US" dirty="0"/>
+              <a:t>Available in functions and in scripts.</a:t>
+            </a:r>
+          </a:p>
+          <a:p>
+            <a:r>
+              <a:rPr lang="en-US" dirty="0"/>
+              <a:t>$1, $2, $n</a:t>
+            </a:r>
+          </a:p>
+          <a:p>
+            <a:r>
+              <a:rPr lang="en-US" dirty="0"/>
+              <a:t>$*, $@</a:t>
+            </a:r>
+          </a:p>
+          <a:p>
+            <a:r>
+              <a:rPr lang="en-US" dirty="0"/>
+              <a:t>$#</a:t>
+            </a:r>
           </a:p>
         </p:txBody>
       </p:sp>
@@ -23504,6 +25233,163 @@
               <a:t>Аргументы</a:t>
             </a:r>
             <a:endParaRPr lang="en-US" dirty="0"/>
+          </a:p>
+        </p:txBody>
+      </p:sp>
+      <p:sp>
+        <p:nvSpPr>
+          <p:cNvPr id="4" name="TextBox 3">
+            <a:extLst>
+              <a:ext uri="{FF2B5EF4-FFF2-40B4-BE49-F238E27FC236}">
+                <a16:creationId xmlns:a16="http://schemas.microsoft.com/office/drawing/2014/main" id="{6DB67282-A9BA-6D42-AA04-74B81B426C5D}"/>
+              </a:ext>
+            </a:extLst>
+          </p:cNvPr>
+          <p:cNvSpPr txBox="1"/>
+          <p:nvPr/>
+        </p:nvSpPr>
+        <p:spPr>
+          <a:xfrm>
+            <a:off x="934279" y="3061253"/>
+            <a:ext cx="7752522" cy="2308324"/>
+          </a:xfrm>
+          <a:prstGeom prst="rect">
+            <a:avLst/>
+          </a:prstGeom>
+          <a:noFill/>
+        </p:spPr>
+        <p:txBody>
+          <a:bodyPr wrap="square" rtlCol="0">
+            <a:spAutoFit/>
+          </a:bodyPr>
+          <a:lstStyle/>
+          <a:p>
+            <a:r>
+              <a:rPr lang="en-GB" dirty="0" err="1"/>
+              <a:t>i</a:t>
+            </a:r>
+            <a:r>
+              <a:rPr lang="en-GB" dirty="0"/>
+              <a:t>=1;</a:t>
+            </a:r>
+            <a:br>
+              <a:rPr lang="en-GB" dirty="0"/>
+            </a:br>
+            <a:r>
+              <a:rPr lang="en-GB" dirty="0"/>
+              <a:t>j=</a:t>
+            </a:r>
+            <a:r>
+              <a:rPr lang="en-GB" b="1" dirty="0"/>
+              <a:t>$#</a:t>
+            </a:r>
+            <a:r>
+              <a:rPr lang="en-GB" dirty="0"/>
+              <a:t>;</a:t>
+            </a:r>
+            <a:br>
+              <a:rPr lang="en-GB" dirty="0"/>
+            </a:br>
+            <a:r>
+              <a:rPr lang="en-GB" b="1" dirty="0"/>
+              <a:t>while</a:t>
+            </a:r>
+            <a:r>
+              <a:rPr lang="en-GB" dirty="0"/>
+              <a:t> [ </a:t>
+            </a:r>
+            <a:r>
+              <a:rPr lang="en-GB" b="1" dirty="0"/>
+              <a:t>$</a:t>
+            </a:r>
+            <a:r>
+              <a:rPr lang="en-GB" b="1" dirty="0" err="1"/>
+              <a:t>i</a:t>
+            </a:r>
+            <a:r>
+              <a:rPr lang="en-GB" dirty="0"/>
+              <a:t> -le </a:t>
+            </a:r>
+            <a:r>
+              <a:rPr lang="en-GB" b="1" dirty="0"/>
+              <a:t>$j</a:t>
+            </a:r>
+            <a:r>
+              <a:rPr lang="en-GB" dirty="0"/>
+              <a:t> ]</a:t>
+            </a:r>
+            <a:br>
+              <a:rPr lang="en-GB" dirty="0"/>
+            </a:br>
+            <a:r>
+              <a:rPr lang="en-GB" b="1" dirty="0"/>
+              <a:t>do</a:t>
+            </a:r>
+            <a:br>
+              <a:rPr lang="en-GB" b="1" dirty="0"/>
+            </a:br>
+            <a:r>
+              <a:rPr lang="en-GB" b="1" dirty="0"/>
+              <a:t>    </a:t>
+            </a:r>
+            <a:r>
+              <a:rPr lang="en-GB" dirty="0"/>
+              <a:t>echo </a:t>
+            </a:r>
+            <a:r>
+              <a:rPr lang="en-GB" b="1" dirty="0"/>
+              <a:t>"Username - $</a:t>
+            </a:r>
+            <a:r>
+              <a:rPr lang="en-GB" b="1" dirty="0" err="1"/>
+              <a:t>i</a:t>
+            </a:r>
+            <a:r>
+              <a:rPr lang="en-GB" b="1" dirty="0"/>
+              <a:t>: $1"</a:t>
+            </a:r>
+            <a:r>
+              <a:rPr lang="en-GB" dirty="0"/>
+              <a:t>;</a:t>
+            </a:r>
+            <a:br>
+              <a:rPr lang="en-GB" dirty="0"/>
+            </a:br>
+            <a:r>
+              <a:rPr lang="en-GB" dirty="0"/>
+              <a:t>    </a:t>
+            </a:r>
+            <a:r>
+              <a:rPr lang="en-GB" dirty="0" err="1"/>
+              <a:t>i</a:t>
+            </a:r>
+            <a:r>
+              <a:rPr lang="en-GB" dirty="0"/>
+              <a:t>=$((</a:t>
+            </a:r>
+            <a:r>
+              <a:rPr lang="en-GB" dirty="0" err="1"/>
+              <a:t>i</a:t>
+            </a:r>
+            <a:r>
+              <a:rPr lang="en-GB" dirty="0"/>
+              <a:t> + 1));</a:t>
+            </a:r>
+            <a:br>
+              <a:rPr lang="en-GB" dirty="0"/>
+            </a:br>
+            <a:r>
+              <a:rPr lang="en-GB" dirty="0"/>
+              <a:t>    shift 1;</a:t>
+            </a:r>
+            <a:br>
+              <a:rPr lang="en-GB" dirty="0"/>
+            </a:br>
+            <a:r>
+              <a:rPr lang="en-GB" b="1" dirty="0"/>
+              <a:t>done</a:t>
+            </a:r>
+            <a:endParaRPr lang="en-RU" dirty="0"/>
           </a:p>
         </p:txBody>
       </p:sp>
@@ -23539,33 +25425,6 @@
       </p:grpSpPr>
       <p:sp>
         <p:nvSpPr>
-          <p:cNvPr id="2" name="Content Placeholder 1">
-            <a:extLst>
-              <a:ext uri="{FF2B5EF4-FFF2-40B4-BE49-F238E27FC236}">
-                <a16:creationId xmlns:a16="http://schemas.microsoft.com/office/drawing/2014/main" id="{5BA0F083-B66A-4CF4-8CE4-B01CF146F152}"/>
-              </a:ext>
-            </a:extLst>
-          </p:cNvPr>
-          <p:cNvSpPr>
-            <a:spLocks noGrp="1"/>
-          </p:cNvSpPr>
-          <p:nvPr>
-            <p:ph idx="1"/>
-          </p:nvPr>
-        </p:nvSpPr>
-        <p:spPr/>
-        <p:txBody>
-          <a:bodyPr>
-            <a:normAutofit/>
-          </a:bodyPr>
-          <a:lstStyle/>
-          <a:p>
-            <a:endParaRPr lang="en-US" dirty="0"/>
-          </a:p>
-        </p:txBody>
-      </p:sp>
-      <p:sp>
-        <p:nvSpPr>
           <p:cNvPr id="3" name="Text Placeholder 2">
             <a:extLst>
               <a:ext uri="{FF2B5EF4-FFF2-40B4-BE49-F238E27FC236}">
@@ -23590,6 +25449,133 @@
               <a:t>Опции</a:t>
             </a:r>
             <a:endParaRPr lang="en-US" dirty="0"/>
+          </a:p>
+        </p:txBody>
+      </p:sp>
+      <p:sp>
+        <p:nvSpPr>
+          <p:cNvPr id="4" name="TextBox 3">
+            <a:extLst>
+              <a:ext uri="{FF2B5EF4-FFF2-40B4-BE49-F238E27FC236}">
+                <a16:creationId xmlns:a16="http://schemas.microsoft.com/office/drawing/2014/main" id="{3DE34926-D646-274C-BADE-251635A6416B}"/>
+              </a:ext>
+            </a:extLst>
+          </p:cNvPr>
+          <p:cNvSpPr txBox="1"/>
+          <p:nvPr/>
+        </p:nvSpPr>
+        <p:spPr>
+          <a:xfrm>
+            <a:off x="1749287" y="1630016"/>
+            <a:ext cx="7454348" cy="2862322"/>
+          </a:xfrm>
+          <a:prstGeom prst="rect">
+            <a:avLst/>
+          </a:prstGeom>
+          <a:noFill/>
+        </p:spPr>
+        <p:txBody>
+          <a:bodyPr wrap="square" rtlCol="0">
+            <a:spAutoFit/>
+          </a:bodyPr>
+          <a:lstStyle/>
+          <a:p>
+            <a:r>
+              <a:rPr lang="en-GB" dirty="0"/>
+              <a:t>while </a:t>
+            </a:r>
+            <a:r>
+              <a:rPr lang="en-GB" dirty="0" err="1"/>
+              <a:t>getopts</a:t>
+            </a:r>
+            <a:r>
+              <a:rPr lang="en-GB" dirty="0"/>
+              <a:t> ":</a:t>
+            </a:r>
+            <a:r>
+              <a:rPr lang="en-GB" dirty="0" err="1"/>
+              <a:t>ht</a:t>
+            </a:r>
+            <a:r>
+              <a:rPr lang="en-GB" dirty="0"/>
+              <a:t>" opt; do</a:t>
+            </a:r>
+            <a:br>
+              <a:rPr lang="en-GB" dirty="0"/>
+            </a:br>
+            <a:r>
+              <a:rPr lang="en-GB" dirty="0"/>
+              <a:t>    case ${opt} in</a:t>
+            </a:r>
+            <a:br>
+              <a:rPr lang="en-GB" dirty="0"/>
+            </a:br>
+            <a:r>
+              <a:rPr lang="en-GB" dirty="0"/>
+              <a:t>        h ) # process option h</a:t>
+            </a:r>
+            <a:br>
+              <a:rPr lang="en-GB" dirty="0"/>
+            </a:br>
+            <a:r>
+              <a:rPr lang="en-GB" dirty="0"/>
+              <a:t>           ;;</a:t>
+            </a:r>
+            <a:br>
+              <a:rPr lang="en-GB" dirty="0"/>
+            </a:br>
+            <a:r>
+              <a:rPr lang="en-GB" dirty="0"/>
+              <a:t>        t ) # process option t</a:t>
+            </a:r>
+            <a:br>
+              <a:rPr lang="en-GB" dirty="0"/>
+            </a:br>
+            <a:r>
+              <a:rPr lang="en-GB" dirty="0"/>
+              <a:t>           ;;</a:t>
+            </a:r>
+            <a:br>
+              <a:rPr lang="en-GB" dirty="0"/>
+            </a:br>
+            <a:r>
+              <a:rPr lang="en-GB" dirty="0"/>
+              <a:t>        \? ) echo "Usage: </a:t>
+            </a:r>
+            <a:r>
+              <a:rPr lang="en-GB" dirty="0" err="1"/>
+              <a:t>cmd</a:t>
+            </a:r>
+            <a:r>
+              <a:rPr lang="en-GB" dirty="0"/>
+              <a:t> [-h] [-t]”</a:t>
+            </a:r>
+            <a:br>
+              <a:rPr lang="en-GB" dirty="0"/>
+            </a:br>
+            <a:r>
+              <a:rPr lang="en-GB" dirty="0"/>
+              <a:t>           ;;</a:t>
+            </a:r>
+            <a:br>
+              <a:rPr lang="en-GB" dirty="0"/>
+            </a:br>
+            <a:r>
+              <a:rPr lang="en-GB" dirty="0"/>
+              <a:t>     </a:t>
+            </a:r>
+            <a:r>
+              <a:rPr lang="en-GB" dirty="0" err="1"/>
+              <a:t>esac</a:t>
+            </a:r>
+            <a:br>
+              <a:rPr lang="en-GB" dirty="0"/>
+            </a:br>
+            <a:r>
+              <a:rPr lang="en-GB" dirty="0"/>
+              <a:t>done</a:t>
+            </a:r>
+            <a:endParaRPr lang="en-RU" dirty="0"/>
           </a:p>
         </p:txBody>
       </p:sp>

</xml_diff>